<commit_message>
Power Point contents change
</commit_message>
<xml_diff>
--- a/documentation/Automotive_UI_Presentation.pptx
+++ b/documentation/Automotive_UI_Presentation.pptx
@@ -114,6 +114,11 @@
       </a:defRPr>
     </a:lvl9pPr>
   </p:defaultTextStyle>
+  <p:extLst>
+    <p:ext uri="{EFAFB233-063F-42B5-8137-9DF3F51BA10A}">
+      <p15:sldGuideLst xmlns:p15="http://schemas.microsoft.com/office/powerpoint/2012/main"/>
+    </p:ext>
+  </p:extLst>
 </p:presentation>
 </file>
 
@@ -199,7 +204,7 @@
           <a:p>
             <a:fld id="{B3964E94-5E53-4289-A622-47837BF0A813}" type="datetimeFigureOut">
               <a:rPr lang="en-CA" smtClean="0"/>
-              <a:t>2019-11-25</a:t>
+              <a:t>2019-11-26</a:t>
             </a:fld>
             <a:endParaRPr lang="en-CA"/>
           </a:p>
@@ -869,7 +874,7 @@
             <a:fld id="{B61BEF0D-F0BB-DE4B-95CE-6DB70DBA9567}" type="datetimeFigureOut">
               <a:rPr lang="en-US" dirty="0"/>
               <a:pPr/>
-              <a:t>11/25/2019</a:t>
+              <a:t>11/26/2019</a:t>
             </a:fld>
             <a:endParaRPr lang="en-US" dirty="0"/>
           </a:p>
@@ -1190,7 +1195,7 @@
             <a:fld id="{B61BEF0D-F0BB-DE4B-95CE-6DB70DBA9567}" type="datetimeFigureOut">
               <a:rPr lang="en-US" dirty="0"/>
               <a:pPr/>
-              <a:t>11/25/2019</a:t>
+              <a:t>11/26/2019</a:t>
             </a:fld>
             <a:endParaRPr lang="en-US" dirty="0"/>
           </a:p>
@@ -1435,7 +1440,7 @@
             <a:fld id="{B61BEF0D-F0BB-DE4B-95CE-6DB70DBA9567}" type="datetimeFigureOut">
               <a:rPr lang="en-US" dirty="0"/>
               <a:pPr/>
-              <a:t>11/25/2019</a:t>
+              <a:t>11/26/2019</a:t>
             </a:fld>
             <a:endParaRPr lang="en-US" dirty="0"/>
           </a:p>
@@ -1771,7 +1776,7 @@
             <a:fld id="{B61BEF0D-F0BB-DE4B-95CE-6DB70DBA9567}" type="datetimeFigureOut">
               <a:rPr lang="en-US" dirty="0"/>
               <a:pPr/>
-              <a:t>11/25/2019</a:t>
+              <a:t>11/26/2019</a:t>
             </a:fld>
             <a:endParaRPr lang="en-US" dirty="0"/>
           </a:p>
@@ -2115,7 +2120,7 @@
             <a:fld id="{B61BEF0D-F0BB-DE4B-95CE-6DB70DBA9567}" type="datetimeFigureOut">
               <a:rPr lang="en-US" dirty="0"/>
               <a:pPr/>
-              <a:t>11/25/2019</a:t>
+              <a:t>11/26/2019</a:t>
             </a:fld>
             <a:endParaRPr lang="en-US" dirty="0"/>
           </a:p>
@@ -2486,7 +2491,7 @@
             <a:fld id="{B61BEF0D-F0BB-DE4B-95CE-6DB70DBA9567}" type="datetimeFigureOut">
               <a:rPr lang="en-US" dirty="0"/>
               <a:pPr/>
-              <a:t>11/25/2019</a:t>
+              <a:t>11/26/2019</a:t>
             </a:fld>
             <a:endParaRPr lang="en-US" dirty="0"/>
           </a:p>
@@ -2953,7 +2958,7 @@
             <a:fld id="{B61BEF0D-F0BB-DE4B-95CE-6DB70DBA9567}" type="datetimeFigureOut">
               <a:rPr lang="en-US" dirty="0"/>
               <a:pPr/>
-              <a:t>11/25/2019</a:t>
+              <a:t>11/26/2019</a:t>
             </a:fld>
             <a:endParaRPr lang="en-US" dirty="0"/>
           </a:p>
@@ -3155,7 +3160,7 @@
             <a:fld id="{B61BEF0D-F0BB-DE4B-95CE-6DB70DBA9567}" type="datetimeFigureOut">
               <a:rPr lang="en-US" dirty="0"/>
               <a:pPr/>
-              <a:t>11/25/2019</a:t>
+              <a:t>11/26/2019</a:t>
             </a:fld>
             <a:endParaRPr lang="en-US" dirty="0"/>
           </a:p>
@@ -3363,7 +3368,7 @@
             <a:fld id="{B61BEF0D-F0BB-DE4B-95CE-6DB70DBA9567}" type="datetimeFigureOut">
               <a:rPr lang="en-US" dirty="0"/>
               <a:pPr/>
-              <a:t>11/25/2019</a:t>
+              <a:t>11/26/2019</a:t>
             </a:fld>
             <a:endParaRPr lang="en-US" dirty="0"/>
           </a:p>
@@ -3590,7 +3595,7 @@
           <a:p>
             <a:fld id="{05BFA754-D5C3-4E66-96A6-867B257F58DC}" type="datetimeFigureOut">
               <a:rPr lang="en-US" dirty="0"/>
-              <a:t>11/25/2019</a:t>
+              <a:t>11/26/2019</a:t>
             </a:fld>
             <a:endParaRPr lang="en-US" dirty="0"/>
           </a:p>
@@ -3834,7 +3839,7 @@
             <a:fld id="{B61BEF0D-F0BB-DE4B-95CE-6DB70DBA9567}" type="datetimeFigureOut">
               <a:rPr lang="en-US" dirty="0"/>
               <a:pPr/>
-              <a:t>11/25/2019</a:t>
+              <a:t>11/26/2019</a:t>
             </a:fld>
             <a:endParaRPr lang="en-US" dirty="0"/>
           </a:p>
@@ -4128,7 +4133,7 @@
           <a:p>
             <a:fld id="{05BFA754-D5C3-4E66-96A6-867B257F58DC}" type="datetimeFigureOut">
               <a:rPr lang="en-US" dirty="0"/>
-              <a:t>11/25/2019</a:t>
+              <a:t>11/26/2019</a:t>
             </a:fld>
             <a:endParaRPr lang="en-US" dirty="0"/>
           </a:p>
@@ -4506,7 +4511,7 @@
             <a:fld id="{B61BEF0D-F0BB-DE4B-95CE-6DB70DBA9567}" type="datetimeFigureOut">
               <a:rPr lang="en-US" dirty="0"/>
               <a:pPr/>
-              <a:t>11/25/2019</a:t>
+              <a:t>11/26/2019</a:t>
             </a:fld>
             <a:endParaRPr lang="en-US" dirty="0"/>
           </a:p>
@@ -4652,7 +4657,7 @@
             <a:fld id="{B61BEF0D-F0BB-DE4B-95CE-6DB70DBA9567}" type="datetimeFigureOut">
               <a:rPr lang="en-US" dirty="0"/>
               <a:pPr/>
-              <a:t>11/25/2019</a:t>
+              <a:t>11/26/2019</a:t>
             </a:fld>
             <a:endParaRPr lang="en-US" dirty="0"/>
           </a:p>
@@ -4775,7 +4780,7 @@
             <a:fld id="{B61BEF0D-F0BB-DE4B-95CE-6DB70DBA9567}" type="datetimeFigureOut">
               <a:rPr lang="en-US" dirty="0"/>
               <a:pPr/>
-              <a:t>11/25/2019</a:t>
+              <a:t>11/26/2019</a:t>
             </a:fld>
             <a:endParaRPr lang="en-US" dirty="0"/>
           </a:p>
@@ -5027,7 +5032,7 @@
             <a:fld id="{B61BEF0D-F0BB-DE4B-95CE-6DB70DBA9567}" type="datetimeFigureOut">
               <a:rPr lang="en-US" dirty="0"/>
               <a:pPr/>
-              <a:t>11/25/2019</a:t>
+              <a:t>11/26/2019</a:t>
             </a:fld>
             <a:endParaRPr lang="en-US" dirty="0"/>
           </a:p>
@@ -5339,7 +5344,7 @@
             <a:fld id="{B61BEF0D-F0BB-DE4B-95CE-6DB70DBA9567}" type="datetimeFigureOut">
               <a:rPr lang="en-US" dirty="0"/>
               <a:pPr/>
-              <a:t>11/25/2019</a:t>
+              <a:t>11/26/2019</a:t>
             </a:fld>
             <a:endParaRPr lang="en-US" dirty="0"/>
           </a:p>
@@ -5580,7 +5585,7 @@
             <a:fld id="{B61BEF0D-F0BB-DE4B-95CE-6DB70DBA9567}" type="datetimeFigureOut">
               <a:rPr lang="en-US" dirty="0"/>
               <a:pPr/>
-              <a:t>11/25/2019</a:t>
+              <a:t>11/26/2019</a:t>
             </a:fld>
             <a:endParaRPr lang="en-US" dirty="0"/>
           </a:p>
@@ -6168,9 +6173,17 @@
           <a:bodyPr/>
           <a:lstStyle/>
           <a:p>
+            <a:pPr algn="l"/>
             <a:r>
               <a:rPr lang="en-CA" dirty="0"/>
-              <a:t>Heartbeat Sensor</a:t>
+              <a:t>Quyen Lu – N01265429 </a:t>
+            </a:r>
+          </a:p>
+          <a:p>
+            <a:pPr algn="l"/>
+            <a:r>
+              <a:rPr lang="en-CA" dirty="0"/>
+              <a:t>CENG 317</a:t>
             </a:r>
           </a:p>
         </p:txBody>
@@ -6236,33 +6249,80 @@
       </p:sp>
       <p:pic>
         <p:nvPicPr>
-          <p:cNvPr id="9" name="Content Placeholder 8">
+          <p:cNvPr id="1026" name="Picture 2" descr="Image result for sen-11574 pulse sensor">
             <a:extLst>
               <a:ext uri="{FF2B5EF4-FFF2-40B4-BE49-F238E27FC236}">
-                <a16:creationId xmlns:a16="http://schemas.microsoft.com/office/drawing/2014/main" id="{3860177C-476C-4CD4-9E20-BAB331596E2E}"/>
+                <a16:creationId xmlns:a16="http://schemas.microsoft.com/office/drawing/2014/main" id="{B695ED4C-4A3A-445F-98F3-987BB2BD92EB}"/>
               </a:ext>
             </a:extLst>
           </p:cNvPr>
           <p:cNvPicPr>
-            <a:picLocks noGrp="1" noChangeAspect="1"/>
+            <a:picLocks noGrp="1" noChangeAspect="1" noChangeArrowheads="1"/>
           </p:cNvPicPr>
           <p:nvPr>
-            <p:ph idx="1"/>
+            <p:ph sz="half" idx="1"/>
           </p:nvPr>
         </p:nvPicPr>
         <p:blipFill>
-          <a:blip r:embed="rId3"/>
+          <a:blip r:embed="rId3">
+            <a:extLst>
+              <a:ext uri="{28A0092B-C50C-407E-A947-70E740481C1C}">
+                <a14:useLocalDpi xmlns:a14="http://schemas.microsoft.com/office/drawing/2010/main" val="0"/>
+              </a:ext>
+            </a:extLst>
+          </a:blip>
           <a:stretch>
             <a:fillRect/>
           </a:stretch>
         </p:blipFill>
-        <p:spPr>
+        <p:spPr bwMode="auto">
           <a:xfrm>
-            <a:off x="4430427" y="2557463"/>
-            <a:ext cx="3331146" cy="3317875"/>
+            <a:off x="2002631" y="2560638"/>
+            <a:ext cx="3309937" cy="3309937"/>
           </a:xfrm>
+          <a:prstGeom prst="rect">
+            <a:avLst/>
+          </a:prstGeom>
+          <a:noFill/>
+          <a:extLst>
+            <a:ext uri="{909E8E84-426E-40DD-AFC4-6F175D3DCCD1}">
+              <a14:hiddenFill xmlns:a14="http://schemas.microsoft.com/office/drawing/2010/main">
+                <a:solidFill>
+                  <a:srgbClr val="FFFFFF"/>
+                </a:solidFill>
+              </a14:hiddenFill>
+            </a:ext>
+          </a:extLst>
         </p:spPr>
       </p:pic>
+      <p:sp>
+        <p:nvSpPr>
+          <p:cNvPr id="4" name="Content Placeholder 3">
+            <a:extLst>
+              <a:ext uri="{FF2B5EF4-FFF2-40B4-BE49-F238E27FC236}">
+                <a16:creationId xmlns:a16="http://schemas.microsoft.com/office/drawing/2014/main" id="{3D7777A3-4EA0-48DF-A6A6-DBCE90F9B3C8}"/>
+              </a:ext>
+            </a:extLst>
+          </p:cNvPr>
+          <p:cNvSpPr>
+            <a:spLocks noGrp="1"/>
+          </p:cNvSpPr>
+          <p:nvPr>
+            <p:ph sz="half" idx="2"/>
+          </p:nvPr>
+        </p:nvSpPr>
+        <p:spPr/>
+        <p:txBody>
+          <a:bodyPr/>
+          <a:lstStyle/>
+          <a:p>
+            <a:r>
+              <a:rPr lang="en-CA" dirty="0"/>
+              <a:t>SEN 11574</a:t>
+            </a:r>
+          </a:p>
+        </p:txBody>
+      </p:sp>
     </p:spTree>
     <p:extLst>
       <p:ext uri="{BB962C8B-B14F-4D97-AF65-F5344CB8AC3E}">
@@ -6394,6 +6454,18 @@
             </a:pPr>
             <a:endParaRPr lang="en-CA" dirty="0"/>
           </a:p>
+          <a:p>
+            <a:pPr marL="0" indent="0">
+              <a:buNone/>
+              <a:tabLst>
+                <a:tab pos="4484688" algn="r"/>
+              </a:tabLst>
+            </a:pPr>
+            <a:r>
+              <a:rPr lang="en-CA" dirty="0"/>
+              <a:t>Subtotal: 	$154.99</a:t>
+            </a:r>
+          </a:p>
         </p:txBody>
       </p:sp>
       <p:sp>
@@ -6417,7 +6489,7 @@
           <a:bodyPr/>
           <a:lstStyle/>
           <a:p>
-            <a:endParaRPr lang="en-CA"/>
+            <a:endParaRPr lang="en-CA" dirty="0"/>
           </a:p>
         </p:txBody>
       </p:sp>

</xml_diff>